<commit_message>
worked on my models and slides
My slides are complete. Made some last minute adjustments to my model to reflect group decisions on variables used.
</commit_message>
<xml_diff>
--- a/Presentation/JuansSlides.pptx
+++ b/Presentation/JuansSlides.pptx
@@ -8,6 +8,7 @@
     <p:sldId id="256" r:id="rId2"/>
     <p:sldId id="257" r:id="rId3"/>
     <p:sldId id="258" r:id="rId4"/>
+    <p:sldId id="259" r:id="rId5"/>
   </p:sldIdLst>
   <p:sldSz cx="9144000" cy="5143500" type="screen16x9"/>
   <p:notesSz cx="6858000" cy="9144000"/>
@@ -3186,12 +3187,7 @@
             <p:ph type="title"/>
           </p:nvPr>
         </p:nvSpPr>
-        <p:spPr>
-          <a:xfrm>
-            <a:off x="457201" y="204787"/>
-            <a:ext cx="3008313" cy="871538"/>
-          </a:xfrm>
-        </p:spPr>
+        <p:spPr/>
         <p:txBody>
           <a:bodyPr/>
           <a:lstStyle/>
@@ -3206,43 +3202,61 @@
           </a:p>
         </p:txBody>
       </p:sp>
-      <p:sp>
-        <p:nvSpPr>
-          <p:cNvPr id="4" name="Text Placeholder 3"/>
-          <p:cNvSpPr>
-            <a:spLocks noGrp="1"/>
-          </p:cNvSpPr>
-          <p:nvPr>
-            <p:ph idx="2" sz="half" type="body"/>
-          </p:nvPr>
-        </p:nvSpPr>
-        <p:spPr/>
-        <p:txBody>
-          <a:bodyPr/>
-          <a:lstStyle/>
-          <a:p>
-            <a:pPr lvl="0"/>
-            <a:r>
-              <a:rPr/>
-              <a:t>Chosen to deal with correlation amongst trees.</a:t>
-            </a:r>
-          </a:p>
-          <a:p>
-            <a:pPr lvl="0"/>
-            <a:r>
-              <a:rPr/>
-              <a:t>59,333 observations. 70:30 Split ~ (41,500 | 17,800)</a:t>
-            </a:r>
-          </a:p>
-          <a:p>
-            <a:pPr lvl="0"/>
-            <a:r>
-              <a:rPr/>
-              <a:t>Fit 500 trees with 4 randomly chosen predictors for each tree.</a:t>
-            </a:r>
-          </a:p>
-        </p:txBody>
-      </p:sp>
+      <mc:AlternateContent xmlns:mc="http://schemas.openxmlformats.org/markup-compatibility/2006">
+        <mc:Choice xmlns:a14="http://schemas.microsoft.com/office/drawing/2010/main" Requires="a14">
+          <p:sp>
+            <p:nvSpPr>
+              <p:cNvPr id="3" name="Content Placeholder 2"/>
+              <p:cNvSpPr>
+                <a:spLocks noGrp="1"/>
+              </p:cNvSpPr>
+              <p:nvPr>
+                <p:ph idx="1" sz="half"/>
+              </p:nvPr>
+            </p:nvSpPr>
+            <p:spPr/>
+            <p:txBody>
+              <a:bodyPr/>
+              <a:lstStyle/>
+              <a:p>
+                <a:pPr lvl="0"/>
+                <a:r>
+                  <a:rPr/>
+                  <a:t>Chosen to deal with correlation amongst trees.</a:t>
+                </a:r>
+              </a:p>
+              <a:p>
+                <a:pPr lvl="0"/>
+                <a:r>
+                  <a:rPr/>
+                  <a:t>58,836 observations. 70:30 Split </a:t>
+                </a:r>
+                <a14:m>
+                  <m:oMath xmlns:m="http://schemas.openxmlformats.org/officeDocument/2006/math">
+                    <m:r>
+                      <m:rPr>
+                        <m:sty m:val="p"/>
+                      </m:rPr>
+                      <m:t>∼</m:t>
+                    </m:r>
+                  </m:oMath>
+                </a14:m>
+                <a:r>
+                  <a:rPr/>
+                  <a:t> (41,200 | 17,600)</a:t>
+                </a:r>
+              </a:p>
+              <a:p>
+                <a:pPr lvl="0"/>
+                <a:r>
+                  <a:rPr/>
+                  <a:t>Fit 500 trees with 4 randomly chosen predictors for each tree.</a:t>
+                </a:r>
+              </a:p>
+            </p:txBody>
+          </p:sp>
+        </mc:Choice>
+      </mc:AlternateContent>
       <p:pic>
         <p:nvPicPr>
           <p:cNvPr descr="JuansSlides_files/figure-pptx/unnamed-chunk-1-1.png" id="0" name="Picture 1"/>
@@ -3259,8 +3273,8 @@
         </p:blipFill>
         <p:spPr bwMode="auto">
           <a:xfrm>
-            <a:off x="3568700" y="635000"/>
-            <a:ext cx="5105400" cy="3505200"/>
+            <a:off x="4648200" y="1498600"/>
+            <a:ext cx="4038600" cy="2781300"/>
           </a:xfrm>
           <a:prstGeom prst="rect">
             <a:avLst/>
@@ -3315,11 +3329,163 @@
             </a:pPr>
             <a:r>
               <a:rPr/>
-              <a:t>Random Forests - Results</a:t>
-            </a:r>
-          </a:p>
-        </p:txBody>
-      </p:sp>
+              <a:t>Predictive Performance - Random Forests</a:t>
+            </a:r>
+          </a:p>
+        </p:txBody>
+      </p:sp>
+      <p:sp>
+        <p:nvSpPr>
+          <p:cNvPr id="3" name="Content Placeholder 2"/>
+          <p:cNvSpPr>
+            <a:spLocks noGrp="1"/>
+          </p:cNvSpPr>
+          <p:nvPr>
+            <p:ph idx="1" sz="half"/>
+          </p:nvPr>
+        </p:nvSpPr>
+        <p:spPr/>
+        <p:txBody>
+          <a:bodyPr/>
+          <a:lstStyle/>
+          <a:p>
+            <a:pPr lvl="0"/>
+            <a:r>
+              <a:rPr b="1"/>
+              <a:t>12.11</a:t>
+            </a:r>
+            <a:r>
+              <a:rPr/>
+              <a:t> OOB RMSE / </a:t>
+            </a:r>
+            <a:r>
+              <a:rPr b="1"/>
+              <a:t>12. 18</a:t>
+            </a:r>
+            <a:r>
+              <a:rPr/>
+              <a:t> Test RMSE. Similar RMSEs is good (generalizes well).</a:t>
+            </a:r>
+          </a:p>
+          <a:p>
+            <a:pPr lvl="0"/>
+            <a:r>
+              <a:rPr/>
+              <a:t>As sentencing length goes up, our models prediction becomes more variable. However, the models’ errors scale proportionally to sentencing length. Meaning we don’t typically get crazy predictions for lower sentencing lengths.</a:t>
+            </a:r>
+          </a:p>
+        </p:txBody>
+      </p:sp>
+      <p:pic>
+        <p:nvPicPr>
+          <p:cNvPr descr="JuansSlides_files/figure-pptx/unnamed-chunk-2-1.png" id="0" name="Picture 1"/>
+          <p:cNvPicPr>
+            <a:picLocks noGrp="1" noChangeAspect="1"/>
+          </p:cNvPicPr>
+          <p:nvPr/>
+        </p:nvPicPr>
+        <p:blipFill>
+          <a:blip r:embed="rId2"/>
+          <a:stretch>
+            <a:fillRect/>
+          </a:stretch>
+        </p:blipFill>
+        <p:spPr bwMode="auto">
+          <a:xfrm>
+            <a:off x="4648200" y="1498600"/>
+            <a:ext cx="4038600" cy="2781300"/>
+          </a:xfrm>
+          <a:prstGeom prst="rect">
+            <a:avLst/>
+          </a:prstGeom>
+          <a:noFill/>
+          <a:ln w="9525">
+            <a:noFill/>
+            <a:headEnd/>
+            <a:tailEnd/>
+          </a:ln>
+        </p:spPr>
+      </p:pic>
+    </p:spTree>
+  </p:cSld>
+</p:sld>
+</file>
+
+<file path=ppt/slides/slide4.xml><?xml version="1.0" encoding="utf-8"?>
+<p:sld xmlns:a="http://schemas.openxmlformats.org/drawingml/2006/main" xmlns:r="http://schemas.openxmlformats.org/officeDocument/2006/relationships" xmlns:p="http://schemas.openxmlformats.org/presentationml/2006/main">
+  <p:cSld>
+    <p:spTree>
+      <p:nvGrpSpPr>
+        <p:cNvPr id="1" name=""/>
+        <p:cNvGrpSpPr/>
+        <p:nvPr/>
+      </p:nvGrpSpPr>
+      <p:grpSpPr>
+        <a:xfrm>
+          <a:off x="0" y="0"/>
+          <a:ext cx="0" cy="0"/>
+          <a:chOff x="0" y="0"/>
+          <a:chExt cx="0" cy="0"/>
+        </a:xfrm>
+      </p:grpSpPr>
+      <p:sp>
+        <p:nvSpPr>
+          <p:cNvPr id="4" name="Text Placeholder 3"/>
+          <p:cNvSpPr>
+            <a:spLocks noGrp="1"/>
+          </p:cNvSpPr>
+          <p:nvPr>
+            <p:ph idx="2" sz="half" type="body"/>
+          </p:nvPr>
+        </p:nvSpPr>
+        <p:spPr/>
+        <p:txBody>
+          <a:bodyPr/>
+          <a:lstStyle/>
+          <a:p>
+            <a:pPr lvl="0" indent="0" marL="0">
+              <a:spcBef>
+                <a:spcPts val="3000"/>
+              </a:spcBef>
+              <a:buNone/>
+            </a:pPr>
+            <a:r>
+              <a:rPr b="1"/>
+              <a:t>Bonus Slides - Complete Variable Importance for RF</a:t>
+            </a:r>
+          </a:p>
+        </p:txBody>
+      </p:sp>
+      <p:pic>
+        <p:nvPicPr>
+          <p:cNvPr descr="JuansSlides_files/figure-pptx/unnamed-chunk-3-1.png" id="0" name="Picture 1"/>
+          <p:cNvPicPr>
+            <a:picLocks noGrp="1" noChangeAspect="1"/>
+          </p:cNvPicPr>
+          <p:nvPr/>
+        </p:nvPicPr>
+        <p:blipFill>
+          <a:blip r:embed="rId2"/>
+          <a:stretch>
+            <a:fillRect/>
+          </a:stretch>
+        </p:blipFill>
+        <p:spPr bwMode="auto">
+          <a:xfrm>
+            <a:off x="3568700" y="635000"/>
+            <a:ext cx="5105400" cy="3505200"/>
+          </a:xfrm>
+          <a:prstGeom prst="rect">
+            <a:avLst/>
+          </a:prstGeom>
+          <a:noFill/>
+          <a:ln w="9525">
+            <a:noFill/>
+            <a:headEnd/>
+            <a:tailEnd/>
+          </a:ln>
+        </p:spPr>
+      </p:pic>
     </p:spTree>
   </p:cSld>
 </p:sld>

</xml_diff>